<commit_message>
typo: Database 2 -> Database 3
changed typo in powerpoint. I was talking about Database 3 not 2
</commit_message>
<xml_diff>
--- a/db3_ucddb/Resampled/Detecting Sleep Apnea – Projet Period 2 - Resampling - SomeResults.pptx
+++ b/db3_ucddb/Resampled/Detecting Sleep Apnea – Projet Period 2 - Resampling - SomeResults.pptx
@@ -3549,7 +3549,7 @@
           <a:p>
             <a:r>
               <a:rPr lang="de-DE" dirty="0"/>
-              <a:t>Database 2: ucddb002 128Hz original (+ </a:t>
+              <a:t>Database 3: ucddb002 128Hz original (+ </a:t>
             </a:r>
             <a:r>
               <a:rPr lang="de-DE" dirty="0" err="1"/>
@@ -3666,7 +3666,7 @@
           <a:p>
             <a:r>
               <a:rPr lang="de-DE" dirty="0"/>
-              <a:t>Database 2: ucddb002 100Hz (+ </a:t>
+              <a:t>Database 3: ucddb002 100Hz (+ </a:t>
             </a:r>
             <a:r>
               <a:rPr lang="de-DE" dirty="0" err="1"/>
@@ -3783,7 +3783,7 @@
           <a:p>
             <a:r>
               <a:rPr lang="de-DE" dirty="0"/>
-              <a:t>Database 2: ucddb025 128Hz original (+ </a:t>
+              <a:t>Database 3: ucddb025 128Hz original (+ </a:t>
             </a:r>
             <a:r>
               <a:rPr lang="de-DE" dirty="0" err="1"/>
@@ -3900,7 +3900,7 @@
           <a:p>
             <a:r>
               <a:rPr lang="de-DE" dirty="0"/>
-              <a:t>Database 2: ucddb025 100Hz (+ </a:t>
+              <a:t>Database 3: ucddb025 100Hz (+ </a:t>
             </a:r>
             <a:r>
               <a:rPr lang="de-DE" dirty="0" err="1"/>
@@ -4215,7 +4215,7 @@
           <a:p>
             <a:r>
               <a:rPr lang="de-DE" dirty="0"/>
-              <a:t>Database 2: 128Hz - all </a:t>
+              <a:t>Database 3: 128Hz - all </a:t>
             </a:r>
             <a:r>
               <a:rPr lang="de-DE" dirty="0" err="1"/>
@@ -4330,8 +4330,12 @@
           <a:lstStyle/>
           <a:p>
             <a:r>
+              <a:rPr lang="de-DE"/>
+              <a:t>Database 3: </a:t>
+            </a:r>
+            <a:r>
               <a:rPr lang="de-DE" dirty="0"/>
-              <a:t>Database 2: 100Hz - all </a:t>
+              <a:t>100Hz - all </a:t>
             </a:r>
             <a:r>
               <a:rPr lang="de-DE" dirty="0" err="1"/>

</xml_diff>

<commit_message>
Revert "typo: Database 2 -> Database 3"
This reverts commit a0170fdb9f83f744fddd5b95f46ad3e26b22d6be.
</commit_message>
<xml_diff>
--- a/db3_ucddb/Resampled/Detecting Sleep Apnea – Projet Period 2 - Resampling - SomeResults.pptx
+++ b/db3_ucddb/Resampled/Detecting Sleep Apnea – Projet Period 2 - Resampling - SomeResults.pptx
@@ -3549,7 +3549,7 @@
           <a:p>
             <a:r>
               <a:rPr lang="de-DE" dirty="0"/>
-              <a:t>Database 3: ucddb002 128Hz original (+ </a:t>
+              <a:t>Database 2: ucddb002 128Hz original (+ </a:t>
             </a:r>
             <a:r>
               <a:rPr lang="de-DE" dirty="0" err="1"/>
@@ -3666,7 +3666,7 @@
           <a:p>
             <a:r>
               <a:rPr lang="de-DE" dirty="0"/>
-              <a:t>Database 3: ucddb002 100Hz (+ </a:t>
+              <a:t>Database 2: ucddb002 100Hz (+ </a:t>
             </a:r>
             <a:r>
               <a:rPr lang="de-DE" dirty="0" err="1"/>
@@ -3783,7 +3783,7 @@
           <a:p>
             <a:r>
               <a:rPr lang="de-DE" dirty="0"/>
-              <a:t>Database 3: ucddb025 128Hz original (+ </a:t>
+              <a:t>Database 2: ucddb025 128Hz original (+ </a:t>
             </a:r>
             <a:r>
               <a:rPr lang="de-DE" dirty="0" err="1"/>
@@ -3900,7 +3900,7 @@
           <a:p>
             <a:r>
               <a:rPr lang="de-DE" dirty="0"/>
-              <a:t>Database 3: ucddb025 100Hz (+ </a:t>
+              <a:t>Database 2: ucddb025 100Hz (+ </a:t>
             </a:r>
             <a:r>
               <a:rPr lang="de-DE" dirty="0" err="1"/>
@@ -4215,7 +4215,7 @@
           <a:p>
             <a:r>
               <a:rPr lang="de-DE" dirty="0"/>
-              <a:t>Database 3: 128Hz - all </a:t>
+              <a:t>Database 2: 128Hz - all </a:t>
             </a:r>
             <a:r>
               <a:rPr lang="de-DE" dirty="0" err="1"/>
@@ -4330,12 +4330,8 @@
           <a:lstStyle/>
           <a:p>
             <a:r>
-              <a:rPr lang="de-DE"/>
-              <a:t>Database 3: </a:t>
-            </a:r>
-            <a:r>
               <a:rPr lang="de-DE" dirty="0"/>
-              <a:t>100Hz - all </a:t>
+              <a:t>Database 2: 100Hz - all </a:t>
             </a:r>
             <a:r>
               <a:rPr lang="de-DE" dirty="0" err="1"/>

</xml_diff>

<commit_message>
Revert "Revert "typo: Database 2 -> Database 3""
This reverts commit 3e42cc47291f2eef5d111268cb6db2e26a466049.
</commit_message>
<xml_diff>
--- a/db3_ucddb/Resampled/Detecting Sleep Apnea – Projet Period 2 - Resampling - SomeResults.pptx
+++ b/db3_ucddb/Resampled/Detecting Sleep Apnea – Projet Period 2 - Resampling - SomeResults.pptx
@@ -3549,7 +3549,7 @@
           <a:p>
             <a:r>
               <a:rPr lang="de-DE" dirty="0"/>
-              <a:t>Database 2: ucddb002 128Hz original (+ </a:t>
+              <a:t>Database 3: ucddb002 128Hz original (+ </a:t>
             </a:r>
             <a:r>
               <a:rPr lang="de-DE" dirty="0" err="1"/>
@@ -3666,7 +3666,7 @@
           <a:p>
             <a:r>
               <a:rPr lang="de-DE" dirty="0"/>
-              <a:t>Database 2: ucddb002 100Hz (+ </a:t>
+              <a:t>Database 3: ucddb002 100Hz (+ </a:t>
             </a:r>
             <a:r>
               <a:rPr lang="de-DE" dirty="0" err="1"/>
@@ -3783,7 +3783,7 @@
           <a:p>
             <a:r>
               <a:rPr lang="de-DE" dirty="0"/>
-              <a:t>Database 2: ucddb025 128Hz original (+ </a:t>
+              <a:t>Database 3: ucddb025 128Hz original (+ </a:t>
             </a:r>
             <a:r>
               <a:rPr lang="de-DE" dirty="0" err="1"/>
@@ -3900,7 +3900,7 @@
           <a:p>
             <a:r>
               <a:rPr lang="de-DE" dirty="0"/>
-              <a:t>Database 2: ucddb025 100Hz (+ </a:t>
+              <a:t>Database 3: ucddb025 100Hz (+ </a:t>
             </a:r>
             <a:r>
               <a:rPr lang="de-DE" dirty="0" err="1"/>
@@ -4215,7 +4215,7 @@
           <a:p>
             <a:r>
               <a:rPr lang="de-DE" dirty="0"/>
-              <a:t>Database 2: 128Hz - all </a:t>
+              <a:t>Database 3: 128Hz - all </a:t>
             </a:r>
             <a:r>
               <a:rPr lang="de-DE" dirty="0" err="1"/>
@@ -4330,8 +4330,12 @@
           <a:lstStyle/>
           <a:p>
             <a:r>
+              <a:rPr lang="de-DE"/>
+              <a:t>Database 3: </a:t>
+            </a:r>
+            <a:r>
               <a:rPr lang="de-DE" dirty="0"/>
-              <a:t>Database 2: 100Hz - all </a:t>
+              <a:t>100Hz - all </a:t>
             </a:r>
             <a:r>
               <a:rPr lang="de-DE" dirty="0" err="1"/>

</xml_diff>